<commit_message>
removed some magic numbers
</commit_message>
<xml_diff>
--- a/Image2ppt/Output/test.pptx
+++ b/Image2ppt/Output/test.pptx
@@ -3105,7 +3105,7 @@
         <p:spPr>
           <a:xfrm>
             <a:off x="0" y="0"/>
-            <a:ext cx="1758854" cy="3044952"/>
+            <a:ext cx="1760570" cy="3047923"/>
           </a:xfrm>
           <a:prstGeom prst="rect">
             <a:avLst/>
@@ -3128,8 +3128,8 @@
         </p:blipFill>
         <p:spPr>
           <a:xfrm>
-            <a:off x="3044952" y="0"/>
-            <a:ext cx="3044952" cy="3044952"/>
+            <a:off x="3047923" y="0"/>
+            <a:ext cx="3047923" cy="3047923"/>
           </a:xfrm>
           <a:prstGeom prst="rect">
             <a:avLst/>
@@ -3152,8 +3152,8 @@
         </p:blipFill>
         <p:spPr>
           <a:xfrm>
-            <a:off x="6099048" y="0"/>
-            <a:ext cx="3044952" cy="3044952"/>
+            <a:off x="6095847" y="0"/>
+            <a:ext cx="3047923" cy="3047923"/>
           </a:xfrm>
           <a:prstGeom prst="rect">
             <a:avLst/>
@@ -3176,8 +3176,8 @@
         </p:blipFill>
         <p:spPr>
           <a:xfrm>
-            <a:off x="9144000" y="0"/>
-            <a:ext cx="3044952" cy="3044952"/>
+            <a:off x="9143771" y="0"/>
+            <a:ext cx="3047923" cy="3047923"/>
           </a:xfrm>
           <a:prstGeom prst="rect">
             <a:avLst/>
@@ -3200,8 +3200,8 @@
         </p:blipFill>
         <p:spPr>
           <a:xfrm>
-            <a:off x="0" y="3813048"/>
-            <a:ext cx="3044952" cy="3044952"/>
+            <a:off x="0" y="3429000"/>
+            <a:ext cx="3047923" cy="3047923"/>
           </a:xfrm>
           <a:prstGeom prst="rect">
             <a:avLst/>
@@ -3224,8 +3224,8 @@
         </p:blipFill>
         <p:spPr>
           <a:xfrm>
-            <a:off x="3044952" y="3813048"/>
-            <a:ext cx="3044952" cy="3044952"/>
+            <a:off x="3047923" y="3429000"/>
+            <a:ext cx="3047923" cy="3047923"/>
           </a:xfrm>
           <a:prstGeom prst="rect">
             <a:avLst/>
@@ -3248,8 +3248,8 @@
         </p:blipFill>
         <p:spPr>
           <a:xfrm>
-            <a:off x="6099048" y="3813048"/>
-            <a:ext cx="3044952" cy="3044952"/>
+            <a:off x="6095847" y="3429000"/>
+            <a:ext cx="3047923" cy="3047923"/>
           </a:xfrm>
           <a:prstGeom prst="rect">
             <a:avLst/>
@@ -3272,8 +3272,8 @@
         </p:blipFill>
         <p:spPr>
           <a:xfrm>
-            <a:off x="9144000" y="3813048"/>
-            <a:ext cx="3044952" cy="3044952"/>
+            <a:off x="9143771" y="3429000"/>
+            <a:ext cx="3047923" cy="3047923"/>
           </a:xfrm>
           <a:prstGeom prst="rect">
             <a:avLst/>

</xml_diff>

<commit_message>
wrote two tests for get ratio function
</commit_message>
<xml_diff>
--- a/Image2ppt/Output/test.pptx
+++ b/Image2ppt/Output/test.pptx
@@ -3105,8 +3105,8 @@
         </p:blipFill>
         <p:spPr>
           <a:xfrm>
-            <a:off x="565119" y="0"/>
-            <a:ext cx="1308100" cy="2286000"/>
+            <a:off x="1130261" y="0"/>
+            <a:ext cx="787400" cy="1371600"/>
           </a:xfrm>
           <a:prstGeom prst="rect">
             <a:avLst/>
@@ -3129,8 +3129,8 @@
         </p:blipFill>
         <p:spPr>
           <a:xfrm>
-            <a:off x="2514508" y="0"/>
-            <a:ext cx="2286000" cy="2286000"/>
+            <a:off x="3886084" y="0"/>
+            <a:ext cx="1371600" cy="1371600"/>
           </a:xfrm>
           <a:prstGeom prst="rect">
             <a:avLst/>
@@ -3153,8 +3153,8 @@
         </p:blipFill>
         <p:spPr>
           <a:xfrm>
-            <a:off x="4952847" y="0"/>
-            <a:ext cx="2286000" cy="2286000"/>
+            <a:off x="6934008" y="0"/>
+            <a:ext cx="1371600" cy="1371600"/>
           </a:xfrm>
           <a:prstGeom prst="rect">
             <a:avLst/>
@@ -3177,8 +3177,8 @@
         </p:blipFill>
         <p:spPr>
           <a:xfrm>
-            <a:off x="7391186" y="0"/>
-            <a:ext cx="2286000" cy="2286000"/>
+            <a:off x="9981932" y="0"/>
+            <a:ext cx="1371600" cy="1371600"/>
           </a:xfrm>
           <a:prstGeom prst="rect">
             <a:avLst/>
@@ -3201,8 +3201,8 @@
         </p:blipFill>
         <p:spPr>
           <a:xfrm>
-            <a:off x="9829525" y="0"/>
-            <a:ext cx="2286000" cy="2286000"/>
+            <a:off x="838161" y="1371600"/>
+            <a:ext cx="1371600" cy="1371600"/>
           </a:xfrm>
           <a:prstGeom prst="rect">
             <a:avLst/>
@@ -3225,8 +3225,8 @@
         </p:blipFill>
         <p:spPr>
           <a:xfrm>
-            <a:off x="76169" y="2286000"/>
-            <a:ext cx="2286000" cy="2286000"/>
+            <a:off x="3886084" y="1371600"/>
+            <a:ext cx="1371600" cy="1371600"/>
           </a:xfrm>
           <a:prstGeom prst="rect">
             <a:avLst/>
@@ -3249,8 +3249,8 @@
         </p:blipFill>
         <p:spPr>
           <a:xfrm>
-            <a:off x="2514508" y="2286000"/>
-            <a:ext cx="2286000" cy="2286000"/>
+            <a:off x="6934008" y="1371600"/>
+            <a:ext cx="1371600" cy="1371600"/>
           </a:xfrm>
           <a:prstGeom prst="rect">
             <a:avLst/>
@@ -3273,8 +3273,8 @@
         </p:blipFill>
         <p:spPr>
           <a:xfrm>
-            <a:off x="4952847" y="2286000"/>
-            <a:ext cx="2286000" cy="2286000"/>
+            <a:off x="9981932" y="1371600"/>
+            <a:ext cx="1371600" cy="1371600"/>
           </a:xfrm>
           <a:prstGeom prst="rect">
             <a:avLst/>
@@ -3297,8 +3297,8 @@
         </p:blipFill>
         <p:spPr>
           <a:xfrm>
-            <a:off x="7314987" y="2514600"/>
-            <a:ext cx="2438400" cy="1828800"/>
+            <a:off x="-38" y="2286000"/>
+            <a:ext cx="3048000" cy="2286000"/>
           </a:xfrm>
           <a:prstGeom prst="rect">
             <a:avLst/>
@@ -3321,8 +3321,8 @@
         </p:blipFill>
         <p:spPr>
           <a:xfrm>
-            <a:off x="10115275" y="2286000"/>
-            <a:ext cx="1714500" cy="2286000"/>
+            <a:off x="4057534" y="2743200"/>
+            <a:ext cx="1028700" cy="1371600"/>
           </a:xfrm>
           <a:prstGeom prst="rect">
             <a:avLst/>
@@ -3345,8 +3345,8 @@
         </p:blipFill>
         <p:spPr>
           <a:xfrm>
-            <a:off x="-30" y="4800600"/>
-            <a:ext cx="2438400" cy="1828800"/>
+            <a:off x="6095809" y="2286000"/>
+            <a:ext cx="3048000" cy="2286000"/>
           </a:xfrm>
           <a:prstGeom prst="rect">
             <a:avLst/>
@@ -3369,8 +3369,8 @@
         </p:blipFill>
         <p:spPr>
           <a:xfrm>
-            <a:off x="2438309" y="4800600"/>
-            <a:ext cx="2438400" cy="1828800"/>
+            <a:off x="9143733" y="2286000"/>
+            <a:ext cx="3048000" cy="2286000"/>
           </a:xfrm>
           <a:prstGeom prst="rect">
             <a:avLst/>
@@ -3393,8 +3393,8 @@
         </p:blipFill>
         <p:spPr>
           <a:xfrm>
-            <a:off x="5238597" y="4572000"/>
-            <a:ext cx="1714500" cy="2286000"/>
+            <a:off x="1009611" y="4114800"/>
+            <a:ext cx="1028700" cy="1371600"/>
           </a:xfrm>
           <a:prstGeom prst="rect">
             <a:avLst/>
@@ -3417,8 +3417,8 @@
         </p:blipFill>
         <p:spPr>
           <a:xfrm>
-            <a:off x="7676936" y="4572000"/>
-            <a:ext cx="1714500" cy="2286000"/>
+            <a:off x="4057534" y="4114800"/>
+            <a:ext cx="1028700" cy="1371600"/>
           </a:xfrm>
           <a:prstGeom prst="rect">
             <a:avLst/>
@@ -3441,8 +3441,128 @@
         </p:blipFill>
         <p:spPr>
           <a:xfrm>
-            <a:off x="10115275" y="4572000"/>
-            <a:ext cx="1714500" cy="2286000"/>
+            <a:off x="7105458" y="4114800"/>
+            <a:ext cx="1028700" cy="1371600"/>
+          </a:xfrm>
+          <a:prstGeom prst="rect">
+            <a:avLst/>
+          </a:prstGeom>
+        </p:spPr>
+      </p:pic>
+      <p:pic>
+        <p:nvPicPr>
+          <p:cNvPr id="17" name="Picture 16" descr="image.gif"/>
+          <p:cNvPicPr>
+            <a:picLocks noChangeAspect="1"/>
+          </p:cNvPicPr>
+          <p:nvPr/>
+        </p:nvPicPr>
+        <p:blipFill>
+          <a:blip r:embed="rId11"/>
+          <a:stretch>
+            <a:fillRect/>
+          </a:stretch>
+        </p:blipFill>
+        <p:spPr>
+          <a:xfrm>
+            <a:off x="10153382" y="4114800"/>
+            <a:ext cx="1028700" cy="1371600"/>
+          </a:xfrm>
+          <a:prstGeom prst="rect">
+            <a:avLst/>
+          </a:prstGeom>
+        </p:spPr>
+      </p:pic>
+      <p:pic>
+        <p:nvPicPr>
+          <p:cNvPr id="18" name="Picture 17" descr="image.gif"/>
+          <p:cNvPicPr>
+            <a:picLocks noChangeAspect="1"/>
+          </p:cNvPicPr>
+          <p:nvPr/>
+        </p:nvPicPr>
+        <p:blipFill>
+          <a:blip r:embed="rId12"/>
+          <a:stretch>
+            <a:fillRect/>
+          </a:stretch>
+        </p:blipFill>
+        <p:spPr>
+          <a:xfrm>
+            <a:off x="1009611" y="5486400"/>
+            <a:ext cx="1028700" cy="1371600"/>
+          </a:xfrm>
+          <a:prstGeom prst="rect">
+            <a:avLst/>
+          </a:prstGeom>
+        </p:spPr>
+      </p:pic>
+      <p:pic>
+        <p:nvPicPr>
+          <p:cNvPr id="19" name="Picture 18" descr="image.gif"/>
+          <p:cNvPicPr>
+            <a:picLocks noChangeAspect="1"/>
+          </p:cNvPicPr>
+          <p:nvPr/>
+        </p:nvPicPr>
+        <p:blipFill>
+          <a:blip r:embed="rId4"/>
+          <a:stretch>
+            <a:fillRect/>
+          </a:stretch>
+        </p:blipFill>
+        <p:spPr>
+          <a:xfrm>
+            <a:off x="3047885" y="5029200"/>
+            <a:ext cx="3048000" cy="2286000"/>
+          </a:xfrm>
+          <a:prstGeom prst="rect">
+            <a:avLst/>
+          </a:prstGeom>
+        </p:spPr>
+      </p:pic>
+      <p:pic>
+        <p:nvPicPr>
+          <p:cNvPr id="20" name="Picture 19" descr="image.gif"/>
+          <p:cNvPicPr>
+            <a:picLocks noChangeAspect="1"/>
+          </p:cNvPicPr>
+          <p:nvPr/>
+        </p:nvPicPr>
+        <p:blipFill>
+          <a:blip r:embed="rId5"/>
+          <a:stretch>
+            <a:fillRect/>
+          </a:stretch>
+        </p:blipFill>
+        <p:spPr>
+          <a:xfrm>
+            <a:off x="7105458" y="5486400"/>
+            <a:ext cx="1028700" cy="1371600"/>
+          </a:xfrm>
+          <a:prstGeom prst="rect">
+            <a:avLst/>
+          </a:prstGeom>
+        </p:spPr>
+      </p:pic>
+      <p:pic>
+        <p:nvPicPr>
+          <p:cNvPr id="21" name="Picture 20" descr="image.gif"/>
+          <p:cNvPicPr>
+            <a:picLocks noChangeAspect="1"/>
+          </p:cNvPicPr>
+          <p:nvPr/>
+        </p:nvPicPr>
+        <p:blipFill>
+          <a:blip r:embed="rId6"/>
+          <a:stretch>
+            <a:fillRect/>
+          </a:stretch>
+        </p:blipFill>
+        <p:spPr>
+          <a:xfrm>
+            <a:off x="9143733" y="5029200"/>
+            <a:ext cx="3048000" cy="2286000"/>
           </a:xfrm>
           <a:prstGeom prst="rect">
             <a:avLst/>
@@ -3483,8 +3603,8 @@
         </p:blipFill>
         <p:spPr>
           <a:xfrm>
-            <a:off x="361919" y="0"/>
-            <a:ext cx="1714500" cy="2286000"/>
+            <a:off x="-38" y="-457200"/>
+            <a:ext cx="3048000" cy="2286000"/>
           </a:xfrm>
           <a:prstGeom prst="rect">
             <a:avLst/>
@@ -3507,8 +3627,8 @@
         </p:blipFill>
         <p:spPr>
           <a:xfrm>
-            <a:off x="2800258" y="0"/>
-            <a:ext cx="1714500" cy="2286000"/>
+            <a:off x="4057534" y="0"/>
+            <a:ext cx="1028700" cy="1371600"/>
           </a:xfrm>
           <a:prstGeom prst="rect">
             <a:avLst/>
@@ -3531,8 +3651,8 @@
         </p:blipFill>
         <p:spPr>
           <a:xfrm>
-            <a:off x="4876648" y="228600"/>
-            <a:ext cx="2438400" cy="1828800"/>
+            <a:off x="7105458" y="0"/>
+            <a:ext cx="1028700" cy="1371600"/>
           </a:xfrm>
           <a:prstGeom prst="rect">
             <a:avLst/>
@@ -3555,8 +3675,8 @@
         </p:blipFill>
         <p:spPr>
           <a:xfrm>
-            <a:off x="7676936" y="0"/>
-            <a:ext cx="1714500" cy="2286000"/>
+            <a:off x="10153382" y="0"/>
+            <a:ext cx="1028700" cy="1371600"/>
           </a:xfrm>
           <a:prstGeom prst="rect">
             <a:avLst/>
@@ -3579,8 +3699,8 @@
         </p:blipFill>
         <p:spPr>
           <a:xfrm>
-            <a:off x="9753326" y="228600"/>
-            <a:ext cx="2438400" cy="1828800"/>
+            <a:off x="1009611" y="1371600"/>
+            <a:ext cx="1028700" cy="1371600"/>
           </a:xfrm>
           <a:prstGeom prst="rect">
             <a:avLst/>
@@ -3603,128 +3723,8 @@
         </p:blipFill>
         <p:spPr>
           <a:xfrm>
-            <a:off x="-30" y="2514600"/>
-            <a:ext cx="2438400" cy="1828800"/>
-          </a:xfrm>
-          <a:prstGeom prst="rect">
-            <a:avLst/>
-          </a:prstGeom>
-        </p:spPr>
-      </p:pic>
-      <p:pic>
-        <p:nvPicPr>
-          <p:cNvPr id="8" name="Picture 7" descr="image.gif"/>
-          <p:cNvPicPr>
-            <a:picLocks noChangeAspect="1"/>
-          </p:cNvPicPr>
-          <p:nvPr/>
-        </p:nvPicPr>
-        <p:blipFill>
-          <a:blip r:embed="rId8"/>
-          <a:stretch>
-            <a:fillRect/>
-          </a:stretch>
-        </p:blipFill>
-        <p:spPr>
-          <a:xfrm>
-            <a:off x="2800258" y="2286000"/>
-            <a:ext cx="1714500" cy="2286000"/>
-          </a:xfrm>
-          <a:prstGeom prst="rect">
-            <a:avLst/>
-          </a:prstGeom>
-        </p:spPr>
-      </p:pic>
-      <p:pic>
-        <p:nvPicPr>
-          <p:cNvPr id="9" name="Picture 8" descr="image.gif"/>
-          <p:cNvPicPr>
-            <a:picLocks noChangeAspect="1"/>
-          </p:cNvPicPr>
-          <p:nvPr/>
-        </p:nvPicPr>
-        <p:blipFill>
-          <a:blip r:embed="rId9"/>
-          <a:stretch>
-            <a:fillRect/>
-          </a:stretch>
-        </p:blipFill>
-        <p:spPr>
-          <a:xfrm>
-            <a:off x="5238597" y="2286000"/>
-            <a:ext cx="1714500" cy="2286000"/>
-          </a:xfrm>
-          <a:prstGeom prst="rect">
-            <a:avLst/>
-          </a:prstGeom>
-        </p:spPr>
-      </p:pic>
-      <p:pic>
-        <p:nvPicPr>
-          <p:cNvPr id="10" name="Picture 9" descr="image.gif"/>
-          <p:cNvPicPr>
-            <a:picLocks noChangeAspect="1"/>
-          </p:cNvPicPr>
-          <p:nvPr/>
-        </p:nvPicPr>
-        <p:blipFill>
-          <a:blip r:embed="rId10"/>
-          <a:stretch>
-            <a:fillRect/>
-          </a:stretch>
-        </p:blipFill>
-        <p:spPr>
-          <a:xfrm>
-            <a:off x="7676936" y="2286000"/>
-            <a:ext cx="1714500" cy="2286000"/>
-          </a:xfrm>
-          <a:prstGeom prst="rect">
-            <a:avLst/>
-          </a:prstGeom>
-        </p:spPr>
-      </p:pic>
-      <p:pic>
-        <p:nvPicPr>
-          <p:cNvPr id="11" name="Picture 10" descr="image.gif"/>
-          <p:cNvPicPr>
-            <a:picLocks noChangeAspect="1"/>
-          </p:cNvPicPr>
-          <p:nvPr/>
-        </p:nvPicPr>
-        <p:blipFill>
-          <a:blip r:embed="rId2"/>
-          <a:stretch>
-            <a:fillRect/>
-          </a:stretch>
-        </p:blipFill>
-        <p:spPr>
-          <a:xfrm>
-            <a:off x="10115275" y="2286000"/>
-            <a:ext cx="1714500" cy="2286000"/>
-          </a:xfrm>
-          <a:prstGeom prst="rect">
-            <a:avLst/>
-          </a:prstGeom>
-        </p:spPr>
-      </p:pic>
-      <p:pic>
-        <p:nvPicPr>
-          <p:cNvPr id="12" name="Picture 11" descr="image.gif"/>
-          <p:cNvPicPr>
-            <a:picLocks noChangeAspect="1"/>
-          </p:cNvPicPr>
-          <p:nvPr/>
-        </p:nvPicPr>
-        <p:blipFill>
-          <a:blip r:embed="rId3"/>
-          <a:stretch>
-            <a:fillRect/>
-          </a:stretch>
-        </p:blipFill>
-        <p:spPr>
-          <a:xfrm>
-            <a:off x="361919" y="4572000"/>
-            <a:ext cx="1714500" cy="2286000"/>
+            <a:off x="4057534" y="1371600"/>
+            <a:ext cx="1028700" cy="1371600"/>
           </a:xfrm>
           <a:prstGeom prst="rect">
             <a:avLst/>

</xml_diff>

<commit_message>
test was not passing
</commit_message>
<xml_diff>
--- a/Image2ppt/Output/test.pptx
+++ b/Image2ppt/Output/test.pptx
@@ -6,6 +6,7 @@
   </p:sldMasterIdLst>
   <p:sldIdLst>
     <p:sldId id="256" r:id="rId7"/>
+    <p:sldId id="257" r:id="rId8"/>
   </p:sldIdLst>
   <p:sldSz cx="12191695" cy="6858000" type="screen4x3"/>
   <p:notesSz cx="6858000" cy="9144000"/>
@@ -3115,7 +3116,7 @@
               <a:defRPr sz="3000"/>
             </a:pPr>
             <a:r>
-              <a:t>Cell 2</a:t>
+              <a:t>Cell 1</a:t>
             </a:r>
           </a:p>
         </p:txBody>
@@ -3136,8 +3137,250 @@
         </p:blipFill>
         <p:spPr>
           <a:xfrm>
-            <a:off x="304769" y="0"/>
-            <a:ext cx="1828800" cy="1371600"/>
+            <a:off x="-38" y="0"/>
+            <a:ext cx="3048000" cy="3048000"/>
+          </a:xfrm>
+          <a:prstGeom prst="rect">
+            <a:avLst/>
+          </a:prstGeom>
+        </p:spPr>
+      </p:pic>
+      <p:pic>
+        <p:nvPicPr>
+          <p:cNvPr id="4" name="Picture 3" descr="image.gif"/>
+          <p:cNvPicPr>
+            <a:picLocks noChangeAspect="1"/>
+          </p:cNvPicPr>
+          <p:nvPr/>
+        </p:nvPicPr>
+        <p:blipFill>
+          <a:blip r:embed="rId2"/>
+          <a:stretch>
+            <a:fillRect/>
+          </a:stretch>
+        </p:blipFill>
+        <p:spPr>
+          <a:xfrm>
+            <a:off x="3047885" y="0"/>
+            <a:ext cx="3048000" cy="3048000"/>
+          </a:xfrm>
+          <a:prstGeom prst="rect">
+            <a:avLst/>
+          </a:prstGeom>
+        </p:spPr>
+      </p:pic>
+      <p:pic>
+        <p:nvPicPr>
+          <p:cNvPr id="5" name="Picture 4" descr="image.gif"/>
+          <p:cNvPicPr>
+            <a:picLocks noChangeAspect="1"/>
+          </p:cNvPicPr>
+          <p:nvPr/>
+        </p:nvPicPr>
+        <p:blipFill>
+          <a:blip r:embed="rId2"/>
+          <a:stretch>
+            <a:fillRect/>
+          </a:stretch>
+        </p:blipFill>
+        <p:spPr>
+          <a:xfrm>
+            <a:off x="6095809" y="0"/>
+            <a:ext cx="3048000" cy="3048000"/>
+          </a:xfrm>
+          <a:prstGeom prst="rect">
+            <a:avLst/>
+          </a:prstGeom>
+        </p:spPr>
+      </p:pic>
+      <p:pic>
+        <p:nvPicPr>
+          <p:cNvPr id="6" name="Picture 5" descr="image.gif"/>
+          <p:cNvPicPr>
+            <a:picLocks noChangeAspect="1"/>
+          </p:cNvPicPr>
+          <p:nvPr/>
+        </p:nvPicPr>
+        <p:blipFill>
+          <a:blip r:embed="rId2"/>
+          <a:stretch>
+            <a:fillRect/>
+          </a:stretch>
+        </p:blipFill>
+        <p:spPr>
+          <a:xfrm>
+            <a:off x="9143733" y="0"/>
+            <a:ext cx="3048000" cy="3048000"/>
+          </a:xfrm>
+          <a:prstGeom prst="rect">
+            <a:avLst/>
+          </a:prstGeom>
+        </p:spPr>
+      </p:pic>
+      <p:pic>
+        <p:nvPicPr>
+          <p:cNvPr id="7" name="Picture 6" descr="image.gif"/>
+          <p:cNvPicPr>
+            <a:picLocks noChangeAspect="1"/>
+          </p:cNvPicPr>
+          <p:nvPr/>
+        </p:nvPicPr>
+        <p:blipFill>
+          <a:blip r:embed="rId2"/>
+          <a:stretch>
+            <a:fillRect/>
+          </a:stretch>
+        </p:blipFill>
+        <p:spPr>
+          <a:xfrm>
+            <a:off x="-38" y="3809999"/>
+            <a:ext cx="3048000" cy="3048000"/>
+          </a:xfrm>
+          <a:prstGeom prst="rect">
+            <a:avLst/>
+          </a:prstGeom>
+        </p:spPr>
+      </p:pic>
+      <p:pic>
+        <p:nvPicPr>
+          <p:cNvPr id="8" name="Picture 7" descr="image.gif"/>
+          <p:cNvPicPr>
+            <a:picLocks noChangeAspect="1"/>
+          </p:cNvPicPr>
+          <p:nvPr/>
+        </p:nvPicPr>
+        <p:blipFill>
+          <a:blip r:embed="rId2"/>
+          <a:stretch>
+            <a:fillRect/>
+          </a:stretch>
+        </p:blipFill>
+        <p:spPr>
+          <a:xfrm>
+            <a:off x="3047885" y="3809999"/>
+            <a:ext cx="3048000" cy="3048000"/>
+          </a:xfrm>
+          <a:prstGeom prst="rect">
+            <a:avLst/>
+          </a:prstGeom>
+        </p:spPr>
+      </p:pic>
+      <p:pic>
+        <p:nvPicPr>
+          <p:cNvPr id="9" name="Picture 8" descr="image.gif"/>
+          <p:cNvPicPr>
+            <a:picLocks noChangeAspect="1"/>
+          </p:cNvPicPr>
+          <p:nvPr/>
+        </p:nvPicPr>
+        <p:blipFill>
+          <a:blip r:embed="rId2"/>
+          <a:stretch>
+            <a:fillRect/>
+          </a:stretch>
+        </p:blipFill>
+        <p:spPr>
+          <a:xfrm>
+            <a:off x="6095809" y="3809999"/>
+            <a:ext cx="3048000" cy="3048000"/>
+          </a:xfrm>
+          <a:prstGeom prst="rect">
+            <a:avLst/>
+          </a:prstGeom>
+        </p:spPr>
+      </p:pic>
+      <p:pic>
+        <p:nvPicPr>
+          <p:cNvPr id="10" name="Picture 9" descr="image.gif"/>
+          <p:cNvPicPr>
+            <a:picLocks noChangeAspect="1"/>
+          </p:cNvPicPr>
+          <p:nvPr/>
+        </p:nvPicPr>
+        <p:blipFill>
+          <a:blip r:embed="rId3"/>
+          <a:stretch>
+            <a:fillRect/>
+          </a:stretch>
+        </p:blipFill>
+        <p:spPr>
+          <a:xfrm>
+            <a:off x="9683482" y="3429000"/>
+            <a:ext cx="1968500" cy="3429000"/>
+          </a:xfrm>
+          <a:prstGeom prst="rect">
+            <a:avLst/>
+          </a:prstGeom>
+        </p:spPr>
+      </p:pic>
+    </p:spTree>
+  </p:cSld>
+  <p:clrMapOvr>
+    <a:masterClrMapping/>
+  </p:clrMapOvr>
+</p:sld>
+</file>
+
+<file path=ppt/slides/slide2.xml><?xml version="1.0" encoding="utf-8"?>
+<p:sld xmlns:a="http://schemas.openxmlformats.org/drawingml/2006/main" xmlns:p="http://schemas.openxmlformats.org/presentationml/2006/main" xmlns:r="http://schemas.openxmlformats.org/officeDocument/2006/relationships">
+  <p:cSld>
+    <p:spTree>
+      <p:nvGrpSpPr>
+        <p:cNvPr id="1" name=""/>
+        <p:cNvGrpSpPr/>
+        <p:nvPr/>
+      </p:nvGrpSpPr>
+      <p:grpSpPr/>
+      <p:sp>
+        <p:nvSpPr>
+          <p:cNvPr id="2" name="TextBox 1"/>
+          <p:cNvSpPr txBox="1"/>
+          <p:nvPr/>
+        </p:nvSpPr>
+        <p:spPr>
+          <a:xfrm>
+            <a:off x="5501487" y="2880360"/>
+            <a:ext cx="914400" cy="914400"/>
+          </a:xfrm>
+          <a:prstGeom prst="rect">
+            <a:avLst/>
+          </a:prstGeom>
+          <a:noFill/>
+        </p:spPr>
+        <p:txBody>
+          <a:bodyPr wrap="none">
+            <a:spAutoFit/>
+          </a:bodyPr>
+          <a:lstStyle/>
+          <a:p/>
+          <a:p>
+            <a:pPr>
+              <a:defRPr sz="3000"/>
+            </a:pPr>
+            <a:r>
+              <a:t>Cell 1</a:t>
+            </a:r>
+          </a:p>
+        </p:txBody>
+      </p:sp>
+      <p:pic>
+        <p:nvPicPr>
+          <p:cNvPr id="3" name="Picture 2" descr="image.gif"/>
+          <p:cNvPicPr>
+            <a:picLocks noChangeAspect="1"/>
+          </p:cNvPicPr>
+          <p:nvPr/>
+        </p:nvPicPr>
+        <p:blipFill>
+          <a:blip r:embed="rId2"/>
+          <a:stretch>
+            <a:fillRect/>
+          </a:stretch>
+        </p:blipFill>
+        <p:spPr>
+          <a:xfrm>
+            <a:off x="241261" y="0"/>
+            <a:ext cx="2565400" cy="3429000"/>
           </a:xfrm>
           <a:prstGeom prst="rect">
             <a:avLst/>
@@ -3160,8 +3403,8 @@
         </p:blipFill>
         <p:spPr>
           <a:xfrm>
-            <a:off x="3143158" y="0"/>
-            <a:ext cx="1028700" cy="1371600"/>
+            <a:off x="3047885" y="0"/>
+            <a:ext cx="3048000" cy="2286000"/>
           </a:xfrm>
           <a:prstGeom prst="rect">
             <a:avLst/>
@@ -3184,8 +3427,8 @@
         </p:blipFill>
         <p:spPr>
           <a:xfrm>
-            <a:off x="5181447" y="0"/>
-            <a:ext cx="1828800" cy="1371600"/>
+            <a:off x="6337108" y="0"/>
+            <a:ext cx="2565400" cy="3429000"/>
           </a:xfrm>
           <a:prstGeom prst="rect">
             <a:avLst/>
@@ -3208,8 +3451,8 @@
         </p:blipFill>
         <p:spPr>
           <a:xfrm>
-            <a:off x="7619786" y="0"/>
-            <a:ext cx="1828800" cy="1371600"/>
+            <a:off x="9385032" y="0"/>
+            <a:ext cx="2565400" cy="3429000"/>
           </a:xfrm>
           <a:prstGeom prst="rect">
             <a:avLst/>
@@ -3232,8 +3475,8 @@
         </p:blipFill>
         <p:spPr>
           <a:xfrm>
-            <a:off x="10458175" y="0"/>
-            <a:ext cx="1028700" cy="1371600"/>
+            <a:off x="-38" y="4572000"/>
+            <a:ext cx="3048000" cy="2286000"/>
           </a:xfrm>
           <a:prstGeom prst="rect">
             <a:avLst/>
@@ -3256,8 +3499,8 @@
         </p:blipFill>
         <p:spPr>
           <a:xfrm>
-            <a:off x="704819" y="1371600"/>
-            <a:ext cx="1028700" cy="1371600"/>
+            <a:off x="3047885" y="4572000"/>
+            <a:ext cx="3048000" cy="2286000"/>
           </a:xfrm>
           <a:prstGeom prst="rect">
             <a:avLst/>
@@ -3280,8 +3523,8 @@
         </p:blipFill>
         <p:spPr>
           <a:xfrm>
-            <a:off x="2743108" y="1371600"/>
-            <a:ext cx="1828800" cy="1371600"/>
+            <a:off x="6337108" y="3429000"/>
+            <a:ext cx="2565400" cy="3429000"/>
           </a:xfrm>
           <a:prstGeom prst="rect">
             <a:avLst/>
@@ -3304,209 +3547,17 @@
         </p:blipFill>
         <p:spPr>
           <a:xfrm>
-            <a:off x="5581497" y="1371600"/>
-            <a:ext cx="1028700" cy="1371600"/>
+            <a:off x="9143733" y="4572000"/>
+            <a:ext cx="3048000" cy="2286000"/>
           </a:xfrm>
           <a:prstGeom prst="rect">
             <a:avLst/>
           </a:prstGeom>
         </p:spPr>
       </p:pic>
-      <p:pic>
-        <p:nvPicPr>
-          <p:cNvPr id="11" name="Picture 10" descr="image.gif"/>
-          <p:cNvPicPr>
-            <a:picLocks noChangeAspect="1"/>
-          </p:cNvPicPr>
-          <p:nvPr/>
-        </p:nvPicPr>
-        <p:blipFill>
-          <a:blip r:embed="rId8"/>
-          <a:stretch>
-            <a:fillRect/>
-          </a:stretch>
-        </p:blipFill>
-        <p:spPr>
-          <a:xfrm>
-            <a:off x="8140486" y="1371600"/>
-            <a:ext cx="787400" cy="1371600"/>
-          </a:xfrm>
-          <a:prstGeom prst="rect">
-            <a:avLst/>
-          </a:prstGeom>
-        </p:spPr>
-      </p:pic>
-      <p:pic>
-        <p:nvPicPr>
-          <p:cNvPr id="12" name="Picture 11" descr="image.gif"/>
-          <p:cNvPicPr>
-            <a:picLocks noChangeAspect="1"/>
-          </p:cNvPicPr>
-          <p:nvPr/>
-        </p:nvPicPr>
-        <p:blipFill>
-          <a:blip r:embed="rId9"/>
-          <a:stretch>
-            <a:fillRect/>
-          </a:stretch>
-        </p:blipFill>
-        <p:spPr>
-          <a:xfrm>
-            <a:off x="10286725" y="1371600"/>
-            <a:ext cx="1371600" cy="1371600"/>
-          </a:xfrm>
-          <a:prstGeom prst="rect">
-            <a:avLst/>
-          </a:prstGeom>
-        </p:spPr>
-      </p:pic>
-      <p:pic>
-        <p:nvPicPr>
-          <p:cNvPr id="13" name="Picture 12" descr="image.gif"/>
-          <p:cNvPicPr>
-            <a:picLocks noChangeAspect="1"/>
-          </p:cNvPicPr>
-          <p:nvPr/>
-        </p:nvPicPr>
-        <p:blipFill>
-          <a:blip r:embed="rId9"/>
-          <a:stretch>
-            <a:fillRect/>
-          </a:stretch>
-        </p:blipFill>
-        <p:spPr>
-          <a:xfrm>
-            <a:off x="533369" y="2743200"/>
-            <a:ext cx="1371600" cy="1371600"/>
-          </a:xfrm>
-          <a:prstGeom prst="rect">
-            <a:avLst/>
-          </a:prstGeom>
-        </p:spPr>
-      </p:pic>
-      <p:pic>
-        <p:nvPicPr>
-          <p:cNvPr id="14" name="Picture 13" descr="image.gif"/>
-          <p:cNvPicPr>
-            <a:picLocks noChangeAspect="1"/>
-          </p:cNvPicPr>
-          <p:nvPr/>
-        </p:nvPicPr>
-        <p:blipFill>
-          <a:blip r:embed="rId9"/>
-          <a:stretch>
-            <a:fillRect/>
-          </a:stretch>
-        </p:blipFill>
-        <p:spPr>
-          <a:xfrm>
-            <a:off x="2971708" y="2743200"/>
-            <a:ext cx="1371600" cy="1371600"/>
-          </a:xfrm>
-          <a:prstGeom prst="rect">
-            <a:avLst/>
-          </a:prstGeom>
-        </p:spPr>
-      </p:pic>
-      <p:pic>
-        <p:nvPicPr>
-          <p:cNvPr id="15" name="Picture 14" descr="image.gif"/>
-          <p:cNvPicPr>
-            <a:picLocks noChangeAspect="1"/>
-          </p:cNvPicPr>
-          <p:nvPr/>
-        </p:nvPicPr>
-        <p:blipFill>
-          <a:blip r:embed="rId9"/>
-          <a:stretch>
-            <a:fillRect/>
-          </a:stretch>
-        </p:blipFill>
-        <p:spPr>
-          <a:xfrm>
-            <a:off x="5410047" y="2743200"/>
-            <a:ext cx="1371600" cy="1371600"/>
-          </a:xfrm>
-          <a:prstGeom prst="rect">
-            <a:avLst/>
-          </a:prstGeom>
-        </p:spPr>
-      </p:pic>
-      <p:pic>
-        <p:nvPicPr>
-          <p:cNvPr id="16" name="Picture 15" descr="image.gif"/>
-          <p:cNvPicPr>
-            <a:picLocks noChangeAspect="1"/>
-          </p:cNvPicPr>
-          <p:nvPr/>
-        </p:nvPicPr>
-        <p:blipFill>
-          <a:blip r:embed="rId9"/>
-          <a:stretch>
-            <a:fillRect/>
-          </a:stretch>
-        </p:blipFill>
-        <p:spPr>
-          <a:xfrm>
-            <a:off x="7848386" y="2743200"/>
-            <a:ext cx="1371600" cy="1371600"/>
-          </a:xfrm>
-          <a:prstGeom prst="rect">
-            <a:avLst/>
-          </a:prstGeom>
-        </p:spPr>
-      </p:pic>
-      <p:pic>
-        <p:nvPicPr>
-          <p:cNvPr id="17" name="Picture 16" descr="image.gif"/>
-          <p:cNvPicPr>
-            <a:picLocks noChangeAspect="1"/>
-          </p:cNvPicPr>
-          <p:nvPr/>
-        </p:nvPicPr>
-        <p:blipFill>
-          <a:blip r:embed="rId9"/>
-          <a:stretch>
-            <a:fillRect/>
-          </a:stretch>
-        </p:blipFill>
-        <p:spPr>
-          <a:xfrm>
-            <a:off x="10286725" y="2743200"/>
-            <a:ext cx="1371600" cy="1371600"/>
-          </a:xfrm>
-          <a:prstGeom prst="rect">
-            <a:avLst/>
-          </a:prstGeom>
-        </p:spPr>
-      </p:pic>
-      <p:pic>
-        <p:nvPicPr>
-          <p:cNvPr id="18" name="Picture 17" descr="image.gif"/>
-          <p:cNvPicPr>
-            <a:picLocks noChangeAspect="1"/>
-          </p:cNvPicPr>
-          <p:nvPr/>
-        </p:nvPicPr>
-        <p:blipFill>
-          <a:blip r:embed="rId9"/>
-          <a:stretch>
-            <a:fillRect/>
-          </a:stretch>
-        </p:blipFill>
-        <p:spPr>
-          <a:xfrm>
-            <a:off x="533369" y="4114800"/>
-            <a:ext cx="1371600" cy="1371600"/>
-          </a:xfrm>
-          <a:prstGeom prst="rect">
-            <a:avLst/>
-          </a:prstGeom>
-        </p:spPr>
-      </p:pic>
-      <p:sp>
-        <p:nvSpPr>
-          <p:cNvPr id="19" name="Rounded Rectangle 18"/>
+      <p:sp>
+        <p:nvSpPr>
+          <p:cNvPr id="11" name="Rounded Rectangle 10"/>
           <p:cNvSpPr/>
           <p:nvPr/>
         </p:nvSpPr>

</xml_diff>

<commit_message>
small refactoring for tabs
</commit_message>
<xml_diff>
--- a/Image2ppt/Output/test.pptx
+++ b/Image2ppt/Output/test.pptx
@@ -7,6 +7,7 @@
   <p:sldIdLst>
     <p:sldId id="256" r:id="rId7"/>
     <p:sldId id="257" r:id="rId8"/>
+    <p:sldId id="258" r:id="rId9"/>
   </p:sldIdLst>
   <p:sldSz cx="12191695" cy="6858000" type="screen4x3"/>
   <p:notesSz cx="6858000" cy="9144000"/>
@@ -3137,8 +3138,8 @@
         </p:blipFill>
         <p:spPr>
           <a:xfrm>
-            <a:off x="666711" y="0"/>
-            <a:ext cx="1714500" cy="1714500"/>
+            <a:off x="-38" y="0"/>
+            <a:ext cx="3048000" cy="2286000"/>
           </a:xfrm>
           <a:prstGeom prst="rect">
             <a:avLst/>
@@ -3154,15 +3155,15 @@
           <p:nvPr/>
         </p:nvPicPr>
         <p:blipFill>
-          <a:blip r:embed="rId2"/>
+          <a:blip r:embed="rId3"/>
           <a:stretch>
             <a:fillRect/>
           </a:stretch>
         </p:blipFill>
         <p:spPr>
           <a:xfrm>
-            <a:off x="3714634" y="0"/>
-            <a:ext cx="1714500" cy="1714500"/>
+            <a:off x="3289184" y="0"/>
+            <a:ext cx="2565400" cy="3429000"/>
           </a:xfrm>
           <a:prstGeom prst="rect">
             <a:avLst/>
@@ -3178,15 +3179,15 @@
           <p:nvPr/>
         </p:nvPicPr>
         <p:blipFill>
-          <a:blip r:embed="rId2"/>
+          <a:blip r:embed="rId4"/>
           <a:stretch>
             <a:fillRect/>
           </a:stretch>
         </p:blipFill>
         <p:spPr>
           <a:xfrm>
-            <a:off x="6762558" y="0"/>
-            <a:ext cx="1714500" cy="1714500"/>
+            <a:off x="6095809" y="0"/>
+            <a:ext cx="3048000" cy="2286000"/>
           </a:xfrm>
           <a:prstGeom prst="rect">
             <a:avLst/>
@@ -3202,15 +3203,15 @@
           <p:nvPr/>
         </p:nvPicPr>
         <p:blipFill>
-          <a:blip r:embed="rId2"/>
+          <a:blip r:embed="rId5"/>
           <a:stretch>
             <a:fillRect/>
           </a:stretch>
         </p:blipFill>
         <p:spPr>
           <a:xfrm>
-            <a:off x="9810482" y="0"/>
-            <a:ext cx="1714500" cy="1714500"/>
+            <a:off x="9143733" y="0"/>
+            <a:ext cx="3048000" cy="2286000"/>
           </a:xfrm>
           <a:prstGeom prst="rect">
             <a:avLst/>
@@ -3226,15 +3227,15 @@
           <p:nvPr/>
         </p:nvPicPr>
         <p:blipFill>
-          <a:blip r:embed="rId2"/>
+          <a:blip r:embed="rId6"/>
           <a:stretch>
             <a:fillRect/>
           </a:stretch>
         </p:blipFill>
         <p:spPr>
           <a:xfrm>
-            <a:off x="666711" y="1714500"/>
-            <a:ext cx="1714500" cy="1714500"/>
+            <a:off x="241261" y="3429000"/>
+            <a:ext cx="2565400" cy="3429000"/>
           </a:xfrm>
           <a:prstGeom prst="rect">
             <a:avLst/>
@@ -3250,15 +3251,15 @@
           <p:nvPr/>
         </p:nvPicPr>
         <p:blipFill>
-          <a:blip r:embed="rId2"/>
+          <a:blip r:embed="rId7"/>
           <a:stretch>
             <a:fillRect/>
           </a:stretch>
         </p:blipFill>
         <p:spPr>
           <a:xfrm>
-            <a:off x="3714634" y="1714500"/>
-            <a:ext cx="1714500" cy="1714500"/>
+            <a:off x="3289184" y="3429000"/>
+            <a:ext cx="2565400" cy="3429000"/>
           </a:xfrm>
           <a:prstGeom prst="rect">
             <a:avLst/>
@@ -3274,15 +3275,15 @@
           <p:nvPr/>
         </p:nvPicPr>
         <p:blipFill>
-          <a:blip r:embed="rId2"/>
+          <a:blip r:embed="rId8"/>
           <a:stretch>
             <a:fillRect/>
           </a:stretch>
         </p:blipFill>
         <p:spPr>
           <a:xfrm>
-            <a:off x="6762558" y="1714500"/>
-            <a:ext cx="1714500" cy="1714500"/>
+            <a:off x="6337108" y="3429000"/>
+            <a:ext cx="2565400" cy="3429000"/>
           </a:xfrm>
           <a:prstGeom prst="rect">
             <a:avLst/>
@@ -3298,207 +3299,15 @@
           <p:nvPr/>
         </p:nvPicPr>
         <p:blipFill>
-          <a:blip r:embed="rId2"/>
+          <a:blip r:embed="rId9"/>
           <a:stretch>
             <a:fillRect/>
           </a:stretch>
         </p:blipFill>
         <p:spPr>
           <a:xfrm>
-            <a:off x="9810482" y="1714500"/>
-            <a:ext cx="1714500" cy="1714500"/>
-          </a:xfrm>
-          <a:prstGeom prst="rect">
-            <a:avLst/>
-          </a:prstGeom>
-        </p:spPr>
-      </p:pic>
-      <p:pic>
-        <p:nvPicPr>
-          <p:cNvPr id="11" name="Picture 10" descr="image.gif"/>
-          <p:cNvPicPr>
-            <a:picLocks noChangeAspect="1"/>
-          </p:cNvPicPr>
-          <p:nvPr/>
-        </p:nvPicPr>
-        <p:blipFill>
-          <a:blip r:embed="rId2"/>
-          <a:stretch>
-            <a:fillRect/>
-          </a:stretch>
-        </p:blipFill>
-        <p:spPr>
-          <a:xfrm>
-            <a:off x="666711" y="3429000"/>
-            <a:ext cx="1714500" cy="1714500"/>
-          </a:xfrm>
-          <a:prstGeom prst="rect">
-            <a:avLst/>
-          </a:prstGeom>
-        </p:spPr>
-      </p:pic>
-      <p:pic>
-        <p:nvPicPr>
-          <p:cNvPr id="12" name="Picture 11" descr="image.gif"/>
-          <p:cNvPicPr>
-            <a:picLocks noChangeAspect="1"/>
-          </p:cNvPicPr>
-          <p:nvPr/>
-        </p:nvPicPr>
-        <p:blipFill>
-          <a:blip r:embed="rId2"/>
-          <a:stretch>
-            <a:fillRect/>
-          </a:stretch>
-        </p:blipFill>
-        <p:spPr>
-          <a:xfrm>
-            <a:off x="3714634" y="3429000"/>
-            <a:ext cx="1714500" cy="1714500"/>
-          </a:xfrm>
-          <a:prstGeom prst="rect">
-            <a:avLst/>
-          </a:prstGeom>
-        </p:spPr>
-      </p:pic>
-      <p:pic>
-        <p:nvPicPr>
-          <p:cNvPr id="13" name="Picture 12" descr="image.gif"/>
-          <p:cNvPicPr>
-            <a:picLocks noChangeAspect="1"/>
-          </p:cNvPicPr>
-          <p:nvPr/>
-        </p:nvPicPr>
-        <p:blipFill>
-          <a:blip r:embed="rId2"/>
-          <a:stretch>
-            <a:fillRect/>
-          </a:stretch>
-        </p:blipFill>
-        <p:spPr>
-          <a:xfrm>
-            <a:off x="6762558" y="3429000"/>
-            <a:ext cx="1714500" cy="1714500"/>
-          </a:xfrm>
-          <a:prstGeom prst="rect">
-            <a:avLst/>
-          </a:prstGeom>
-        </p:spPr>
-      </p:pic>
-      <p:pic>
-        <p:nvPicPr>
-          <p:cNvPr id="14" name="Picture 13" descr="image.gif"/>
-          <p:cNvPicPr>
-            <a:picLocks noChangeAspect="1"/>
-          </p:cNvPicPr>
-          <p:nvPr/>
-        </p:nvPicPr>
-        <p:blipFill>
-          <a:blip r:embed="rId2"/>
-          <a:stretch>
-            <a:fillRect/>
-          </a:stretch>
-        </p:blipFill>
-        <p:spPr>
-          <a:xfrm>
-            <a:off x="9810482" y="3429000"/>
-            <a:ext cx="1714500" cy="1714500"/>
-          </a:xfrm>
-          <a:prstGeom prst="rect">
-            <a:avLst/>
-          </a:prstGeom>
-        </p:spPr>
-      </p:pic>
-      <p:pic>
-        <p:nvPicPr>
-          <p:cNvPr id="15" name="Picture 14" descr="image.gif"/>
-          <p:cNvPicPr>
-            <a:picLocks noChangeAspect="1"/>
-          </p:cNvPicPr>
-          <p:nvPr/>
-        </p:nvPicPr>
-        <p:blipFill>
-          <a:blip r:embed="rId2"/>
-          <a:stretch>
-            <a:fillRect/>
-          </a:stretch>
-        </p:blipFill>
-        <p:spPr>
-          <a:xfrm>
-            <a:off x="666711" y="5143500"/>
-            <a:ext cx="1714500" cy="1714500"/>
-          </a:xfrm>
-          <a:prstGeom prst="rect">
-            <a:avLst/>
-          </a:prstGeom>
-        </p:spPr>
-      </p:pic>
-      <p:pic>
-        <p:nvPicPr>
-          <p:cNvPr id="16" name="Picture 15" descr="image.gif"/>
-          <p:cNvPicPr>
-            <a:picLocks noChangeAspect="1"/>
-          </p:cNvPicPr>
-          <p:nvPr/>
-        </p:nvPicPr>
-        <p:blipFill>
-          <a:blip r:embed="rId2"/>
-          <a:stretch>
-            <a:fillRect/>
-          </a:stretch>
-        </p:blipFill>
-        <p:spPr>
-          <a:xfrm>
-            <a:off x="3714634" y="5143500"/>
-            <a:ext cx="1714500" cy="1714500"/>
-          </a:xfrm>
-          <a:prstGeom prst="rect">
-            <a:avLst/>
-          </a:prstGeom>
-        </p:spPr>
-      </p:pic>
-      <p:pic>
-        <p:nvPicPr>
-          <p:cNvPr id="17" name="Picture 16" descr="image.gif"/>
-          <p:cNvPicPr>
-            <a:picLocks noChangeAspect="1"/>
-          </p:cNvPicPr>
-          <p:nvPr/>
-        </p:nvPicPr>
-        <p:blipFill>
-          <a:blip r:embed="rId2"/>
-          <a:stretch>
-            <a:fillRect/>
-          </a:stretch>
-        </p:blipFill>
-        <p:spPr>
-          <a:xfrm>
-            <a:off x="6762558" y="5143500"/>
-            <a:ext cx="1714500" cy="1714500"/>
-          </a:xfrm>
-          <a:prstGeom prst="rect">
-            <a:avLst/>
-          </a:prstGeom>
-        </p:spPr>
-      </p:pic>
-      <p:pic>
-        <p:nvPicPr>
-          <p:cNvPr id="18" name="Picture 17" descr="image.gif"/>
-          <p:cNvPicPr>
-            <a:picLocks noChangeAspect="1"/>
-          </p:cNvPicPr>
-          <p:nvPr/>
-        </p:nvPicPr>
-        <p:blipFill>
-          <a:blip r:embed="rId2"/>
-          <a:stretch>
-            <a:fillRect/>
-          </a:stretch>
-        </p:blipFill>
-        <p:spPr>
-          <a:xfrm>
-            <a:off x="9810482" y="5143500"/>
-            <a:ext cx="1714500" cy="1714500"/>
+            <a:off x="9385032" y="3429000"/>
+            <a:ext cx="2565400" cy="3429000"/>
           </a:xfrm>
           <a:prstGeom prst="rect">
             <a:avLst/>
@@ -3571,8 +3380,8 @@
         </p:blipFill>
         <p:spPr>
           <a:xfrm>
-            <a:off x="666711" y="0"/>
-            <a:ext cx="1714500" cy="1714500"/>
+            <a:off x="241261" y="0"/>
+            <a:ext cx="2565400" cy="3429000"/>
           </a:xfrm>
           <a:prstGeom prst="rect">
             <a:avLst/>
@@ -3582,6 +3391,224 @@
       <p:pic>
         <p:nvPicPr>
           <p:cNvPr id="4" name="Picture 3" descr="image.gif"/>
+          <p:cNvPicPr>
+            <a:picLocks noChangeAspect="1"/>
+          </p:cNvPicPr>
+          <p:nvPr/>
+        </p:nvPicPr>
+        <p:blipFill>
+          <a:blip r:embed="rId3"/>
+          <a:stretch>
+            <a:fillRect/>
+          </a:stretch>
+        </p:blipFill>
+        <p:spPr>
+          <a:xfrm>
+            <a:off x="3047885" y="0"/>
+            <a:ext cx="3048000" cy="2286000"/>
+          </a:xfrm>
+          <a:prstGeom prst="rect">
+            <a:avLst/>
+          </a:prstGeom>
+        </p:spPr>
+      </p:pic>
+      <p:pic>
+        <p:nvPicPr>
+          <p:cNvPr id="5" name="Picture 4" descr="image.gif"/>
+          <p:cNvPicPr>
+            <a:picLocks noChangeAspect="1"/>
+          </p:cNvPicPr>
+          <p:nvPr/>
+        </p:nvPicPr>
+        <p:blipFill>
+          <a:blip r:embed="rId4"/>
+          <a:stretch>
+            <a:fillRect/>
+          </a:stretch>
+        </p:blipFill>
+        <p:spPr>
+          <a:xfrm>
+            <a:off x="6337108" y="0"/>
+            <a:ext cx="2565400" cy="3429000"/>
+          </a:xfrm>
+          <a:prstGeom prst="rect">
+            <a:avLst/>
+          </a:prstGeom>
+        </p:spPr>
+      </p:pic>
+      <p:pic>
+        <p:nvPicPr>
+          <p:cNvPr id="6" name="Picture 5" descr="image.gif"/>
+          <p:cNvPicPr>
+            <a:picLocks noChangeAspect="1"/>
+          </p:cNvPicPr>
+          <p:nvPr/>
+        </p:nvPicPr>
+        <p:blipFill>
+          <a:blip r:embed="rId5"/>
+          <a:stretch>
+            <a:fillRect/>
+          </a:stretch>
+        </p:blipFill>
+        <p:spPr>
+          <a:xfrm>
+            <a:off x="9143733" y="0"/>
+            <a:ext cx="3048000" cy="2286000"/>
+          </a:xfrm>
+          <a:prstGeom prst="rect">
+            <a:avLst/>
+          </a:prstGeom>
+        </p:spPr>
+      </p:pic>
+      <p:pic>
+        <p:nvPicPr>
+          <p:cNvPr id="7" name="Picture 6" descr="image.gif"/>
+          <p:cNvPicPr>
+            <a:picLocks noChangeAspect="1"/>
+          </p:cNvPicPr>
+          <p:nvPr/>
+        </p:nvPicPr>
+        <p:blipFill>
+          <a:blip r:embed="rId6"/>
+          <a:stretch>
+            <a:fillRect/>
+          </a:stretch>
+        </p:blipFill>
+        <p:spPr>
+          <a:xfrm>
+            <a:off x="-38" y="4572000"/>
+            <a:ext cx="3048000" cy="2286000"/>
+          </a:xfrm>
+          <a:prstGeom prst="rect">
+            <a:avLst/>
+          </a:prstGeom>
+        </p:spPr>
+      </p:pic>
+      <p:pic>
+        <p:nvPicPr>
+          <p:cNvPr id="8" name="Picture 7" descr="image.gif"/>
+          <p:cNvPicPr>
+            <a:picLocks noChangeAspect="1"/>
+          </p:cNvPicPr>
+          <p:nvPr/>
+        </p:nvPicPr>
+        <p:blipFill>
+          <a:blip r:embed="rId7"/>
+          <a:stretch>
+            <a:fillRect/>
+          </a:stretch>
+        </p:blipFill>
+        <p:spPr>
+          <a:xfrm>
+            <a:off x="3289184" y="3429000"/>
+            <a:ext cx="2565400" cy="3429000"/>
+          </a:xfrm>
+          <a:prstGeom prst="rect">
+            <a:avLst/>
+          </a:prstGeom>
+        </p:spPr>
+      </p:pic>
+      <p:pic>
+        <p:nvPicPr>
+          <p:cNvPr id="9" name="Picture 8" descr="image.gif"/>
+          <p:cNvPicPr>
+            <a:picLocks noChangeAspect="1"/>
+          </p:cNvPicPr>
+          <p:nvPr/>
+        </p:nvPicPr>
+        <p:blipFill>
+          <a:blip r:embed="rId8"/>
+          <a:stretch>
+            <a:fillRect/>
+          </a:stretch>
+        </p:blipFill>
+        <p:spPr>
+          <a:xfrm>
+            <a:off x="6337108" y="3429000"/>
+            <a:ext cx="2565400" cy="3429000"/>
+          </a:xfrm>
+          <a:prstGeom prst="rect">
+            <a:avLst/>
+          </a:prstGeom>
+        </p:spPr>
+      </p:pic>
+      <p:pic>
+        <p:nvPicPr>
+          <p:cNvPr id="10" name="Picture 9" descr="image.gif"/>
+          <p:cNvPicPr>
+            <a:picLocks noChangeAspect="1"/>
+          </p:cNvPicPr>
+          <p:nvPr/>
+        </p:nvPicPr>
+        <p:blipFill>
+          <a:blip r:embed="rId9"/>
+          <a:stretch>
+            <a:fillRect/>
+          </a:stretch>
+        </p:blipFill>
+        <p:spPr>
+          <a:xfrm>
+            <a:off x="9385032" y="3429000"/>
+            <a:ext cx="2565400" cy="3429000"/>
+          </a:xfrm>
+          <a:prstGeom prst="rect">
+            <a:avLst/>
+          </a:prstGeom>
+        </p:spPr>
+      </p:pic>
+    </p:spTree>
+  </p:cSld>
+  <p:clrMapOvr>
+    <a:masterClrMapping/>
+  </p:clrMapOvr>
+</p:sld>
+</file>
+
+<file path=ppt/slides/slide3.xml><?xml version="1.0" encoding="utf-8"?>
+<p:sld xmlns:a="http://schemas.openxmlformats.org/drawingml/2006/main" xmlns:p="http://schemas.openxmlformats.org/presentationml/2006/main" xmlns:r="http://schemas.openxmlformats.org/officeDocument/2006/relationships">
+  <p:cSld>
+    <p:spTree>
+      <p:nvGrpSpPr>
+        <p:cNvPr id="1" name=""/>
+        <p:cNvGrpSpPr/>
+        <p:nvPr/>
+      </p:nvGrpSpPr>
+      <p:grpSpPr/>
+      <p:sp>
+        <p:nvSpPr>
+          <p:cNvPr id="2" name="TextBox 1"/>
+          <p:cNvSpPr txBox="1"/>
+          <p:nvPr/>
+        </p:nvSpPr>
+        <p:spPr>
+          <a:xfrm>
+            <a:off x="5501487" y="2880360"/>
+            <a:ext cx="914400" cy="914400"/>
+          </a:xfrm>
+          <a:prstGeom prst="rect">
+            <a:avLst/>
+          </a:prstGeom>
+          <a:noFill/>
+        </p:spPr>
+        <p:txBody>
+          <a:bodyPr wrap="none">
+            <a:spAutoFit/>
+          </a:bodyPr>
+          <a:lstStyle/>
+          <a:p/>
+          <a:p>
+            <a:pPr>
+              <a:defRPr sz="3000"/>
+            </a:pPr>
+            <a:r>
+              <a:t>Cell 2</a:t>
+            </a:r>
+          </a:p>
+        </p:txBody>
+      </p:sp>
+      <p:pic>
+        <p:nvPicPr>
+          <p:cNvPr id="3" name="Picture 2" descr="image.gif"/>
           <p:cNvPicPr>
             <a:picLocks noChangeAspect="1"/>
           </p:cNvPicPr>
@@ -3595,8 +3622,8 @@
         </p:blipFill>
         <p:spPr>
           <a:xfrm>
-            <a:off x="3714634" y="0"/>
-            <a:ext cx="1714500" cy="1714500"/>
+            <a:off x="241261" y="0"/>
+            <a:ext cx="2565400" cy="3429000"/>
           </a:xfrm>
           <a:prstGeom prst="rect">
             <a:avLst/>
@@ -3605,238 +3632,22 @@
       </p:pic>
       <p:pic>
         <p:nvPicPr>
-          <p:cNvPr id="5" name="Picture 4" descr="image.gif"/>
+          <p:cNvPr id="4" name="Picture 3" descr="image.gif"/>
           <p:cNvPicPr>
             <a:picLocks noChangeAspect="1"/>
           </p:cNvPicPr>
           <p:nvPr/>
         </p:nvPicPr>
         <p:blipFill>
-          <a:blip r:embed="rId2"/>
+          <a:blip r:embed="rId3"/>
           <a:stretch>
             <a:fillRect/>
           </a:stretch>
         </p:blipFill>
         <p:spPr>
           <a:xfrm>
-            <a:off x="6762558" y="0"/>
-            <a:ext cx="1714500" cy="1714500"/>
-          </a:xfrm>
-          <a:prstGeom prst="rect">
-            <a:avLst/>
-          </a:prstGeom>
-        </p:spPr>
-      </p:pic>
-      <p:pic>
-        <p:nvPicPr>
-          <p:cNvPr id="6" name="Picture 5" descr="image.gif"/>
-          <p:cNvPicPr>
-            <a:picLocks noChangeAspect="1"/>
-          </p:cNvPicPr>
-          <p:nvPr/>
-        </p:nvPicPr>
-        <p:blipFill>
-          <a:blip r:embed="rId2"/>
-          <a:stretch>
-            <a:fillRect/>
-          </a:stretch>
-        </p:blipFill>
-        <p:spPr>
-          <a:xfrm>
-            <a:off x="9810482" y="0"/>
-            <a:ext cx="1714500" cy="1714500"/>
-          </a:xfrm>
-          <a:prstGeom prst="rect">
-            <a:avLst/>
-          </a:prstGeom>
-        </p:spPr>
-      </p:pic>
-      <p:pic>
-        <p:nvPicPr>
-          <p:cNvPr id="7" name="Picture 6" descr="image.gif"/>
-          <p:cNvPicPr>
-            <a:picLocks noChangeAspect="1"/>
-          </p:cNvPicPr>
-          <p:nvPr/>
-        </p:nvPicPr>
-        <p:blipFill>
-          <a:blip r:embed="rId2"/>
-          <a:stretch>
-            <a:fillRect/>
-          </a:stretch>
-        </p:blipFill>
-        <p:spPr>
-          <a:xfrm>
-            <a:off x="666711" y="1714500"/>
-            <a:ext cx="1714500" cy="1714500"/>
-          </a:xfrm>
-          <a:prstGeom prst="rect">
-            <a:avLst/>
-          </a:prstGeom>
-        </p:spPr>
-      </p:pic>
-      <p:pic>
-        <p:nvPicPr>
-          <p:cNvPr id="8" name="Picture 7" descr="image.gif"/>
-          <p:cNvPicPr>
-            <a:picLocks noChangeAspect="1"/>
-          </p:cNvPicPr>
-          <p:nvPr/>
-        </p:nvPicPr>
-        <p:blipFill>
-          <a:blip r:embed="rId2"/>
-          <a:stretch>
-            <a:fillRect/>
-          </a:stretch>
-        </p:blipFill>
-        <p:spPr>
-          <a:xfrm>
-            <a:off x="3714634" y="1714500"/>
-            <a:ext cx="1714500" cy="1714500"/>
-          </a:xfrm>
-          <a:prstGeom prst="rect">
-            <a:avLst/>
-          </a:prstGeom>
-        </p:spPr>
-      </p:pic>
-      <p:pic>
-        <p:nvPicPr>
-          <p:cNvPr id="9" name="Picture 8" descr="image.gif"/>
-          <p:cNvPicPr>
-            <a:picLocks noChangeAspect="1"/>
-          </p:cNvPicPr>
-          <p:nvPr/>
-        </p:nvPicPr>
-        <p:blipFill>
-          <a:blip r:embed="rId2"/>
-          <a:stretch>
-            <a:fillRect/>
-          </a:stretch>
-        </p:blipFill>
-        <p:spPr>
-          <a:xfrm>
-            <a:off x="6762558" y="1714500"/>
-            <a:ext cx="1714500" cy="1714500"/>
-          </a:xfrm>
-          <a:prstGeom prst="rect">
-            <a:avLst/>
-          </a:prstGeom>
-        </p:spPr>
-      </p:pic>
-      <p:pic>
-        <p:nvPicPr>
-          <p:cNvPr id="10" name="Picture 9" descr="image.gif"/>
-          <p:cNvPicPr>
-            <a:picLocks noChangeAspect="1"/>
-          </p:cNvPicPr>
-          <p:nvPr/>
-        </p:nvPicPr>
-        <p:blipFill>
-          <a:blip r:embed="rId2"/>
-          <a:stretch>
-            <a:fillRect/>
-          </a:stretch>
-        </p:blipFill>
-        <p:spPr>
-          <a:xfrm>
-            <a:off x="9810482" y="1714500"/>
-            <a:ext cx="1714500" cy="1714500"/>
-          </a:xfrm>
-          <a:prstGeom prst="rect">
-            <a:avLst/>
-          </a:prstGeom>
-        </p:spPr>
-      </p:pic>
-      <p:pic>
-        <p:nvPicPr>
-          <p:cNvPr id="11" name="Picture 10" descr="image.gif"/>
-          <p:cNvPicPr>
-            <a:picLocks noChangeAspect="1"/>
-          </p:cNvPicPr>
-          <p:nvPr/>
-        </p:nvPicPr>
-        <p:blipFill>
-          <a:blip r:embed="rId2"/>
-          <a:stretch>
-            <a:fillRect/>
-          </a:stretch>
-        </p:blipFill>
-        <p:spPr>
-          <a:xfrm>
-            <a:off x="666711" y="3429000"/>
-            <a:ext cx="1714500" cy="1714500"/>
-          </a:xfrm>
-          <a:prstGeom prst="rect">
-            <a:avLst/>
-          </a:prstGeom>
-        </p:spPr>
-      </p:pic>
-      <p:pic>
-        <p:nvPicPr>
-          <p:cNvPr id="12" name="Picture 11" descr="image.gif"/>
-          <p:cNvPicPr>
-            <a:picLocks noChangeAspect="1"/>
-          </p:cNvPicPr>
-          <p:nvPr/>
-        </p:nvPicPr>
-        <p:blipFill>
-          <a:blip r:embed="rId2"/>
-          <a:stretch>
-            <a:fillRect/>
-          </a:stretch>
-        </p:blipFill>
-        <p:spPr>
-          <a:xfrm>
-            <a:off x="3714634" y="3429000"/>
-            <a:ext cx="1714500" cy="1714500"/>
-          </a:xfrm>
-          <a:prstGeom prst="rect">
-            <a:avLst/>
-          </a:prstGeom>
-        </p:spPr>
-      </p:pic>
-      <p:pic>
-        <p:nvPicPr>
-          <p:cNvPr id="13" name="Picture 12" descr="image.gif"/>
-          <p:cNvPicPr>
-            <a:picLocks noChangeAspect="1"/>
-          </p:cNvPicPr>
-          <p:nvPr/>
-        </p:nvPicPr>
-        <p:blipFill>
-          <a:blip r:embed="rId2"/>
-          <a:stretch>
-            <a:fillRect/>
-          </a:stretch>
-        </p:blipFill>
-        <p:spPr>
-          <a:xfrm>
-            <a:off x="6762558" y="3429000"/>
-            <a:ext cx="1714500" cy="1714500"/>
-          </a:xfrm>
-          <a:prstGeom prst="rect">
-            <a:avLst/>
-          </a:prstGeom>
-        </p:spPr>
-      </p:pic>
-      <p:pic>
-        <p:nvPicPr>
-          <p:cNvPr id="14" name="Picture 13" descr="image.gif"/>
-          <p:cNvPicPr>
-            <a:picLocks noChangeAspect="1"/>
-          </p:cNvPicPr>
-          <p:nvPr/>
-        </p:nvPicPr>
-        <p:blipFill>
-          <a:blip r:embed="rId2"/>
-          <a:stretch>
-            <a:fillRect/>
-          </a:stretch>
-        </p:blipFill>
-        <p:spPr>
-          <a:xfrm>
-            <a:off x="9810482" y="3429000"/>
-            <a:ext cx="1714500" cy="1714500"/>
+            <a:off x="3289184" y="0"/>
+            <a:ext cx="2565400" cy="3429000"/>
           </a:xfrm>
           <a:prstGeom prst="rect">
             <a:avLst/>

</xml_diff>